<commit_message>
Minor changes to command line slides and exercises.
</commit_message>
<xml_diff>
--- a/downloads/command-line.pptx
+++ b/downloads/command-line.pptx
@@ -7,28 +7,29 @@
   <p:sldIdLst>
     <p:sldId id="256" r:id="rId2"/>
     <p:sldId id="257" r:id="rId3"/>
-    <p:sldId id="258" r:id="rId4"/>
-    <p:sldId id="270" r:id="rId5"/>
-    <p:sldId id="271" r:id="rId6"/>
-    <p:sldId id="259" r:id="rId7"/>
-    <p:sldId id="260" r:id="rId8"/>
-    <p:sldId id="272" r:id="rId9"/>
-    <p:sldId id="273" r:id="rId10"/>
-    <p:sldId id="274" r:id="rId11"/>
-    <p:sldId id="275" r:id="rId12"/>
-    <p:sldId id="261" r:id="rId13"/>
-    <p:sldId id="262" r:id="rId14"/>
-    <p:sldId id="263" r:id="rId15"/>
-    <p:sldId id="276" r:id="rId16"/>
-    <p:sldId id="264" r:id="rId17"/>
-    <p:sldId id="265" r:id="rId18"/>
-    <p:sldId id="279" r:id="rId19"/>
-    <p:sldId id="278" r:id="rId20"/>
-    <p:sldId id="266" r:id="rId21"/>
-    <p:sldId id="267" r:id="rId22"/>
-    <p:sldId id="269" r:id="rId23"/>
-    <p:sldId id="277" r:id="rId24"/>
-    <p:sldId id="281" r:id="rId25"/>
+    <p:sldId id="282" r:id="rId4"/>
+    <p:sldId id="258" r:id="rId5"/>
+    <p:sldId id="270" r:id="rId6"/>
+    <p:sldId id="271" r:id="rId7"/>
+    <p:sldId id="259" r:id="rId8"/>
+    <p:sldId id="260" r:id="rId9"/>
+    <p:sldId id="272" r:id="rId10"/>
+    <p:sldId id="273" r:id="rId11"/>
+    <p:sldId id="274" r:id="rId12"/>
+    <p:sldId id="275" r:id="rId13"/>
+    <p:sldId id="261" r:id="rId14"/>
+    <p:sldId id="262" r:id="rId15"/>
+    <p:sldId id="263" r:id="rId16"/>
+    <p:sldId id="276" r:id="rId17"/>
+    <p:sldId id="264" r:id="rId18"/>
+    <p:sldId id="265" r:id="rId19"/>
+    <p:sldId id="279" r:id="rId20"/>
+    <p:sldId id="278" r:id="rId21"/>
+    <p:sldId id="266" r:id="rId22"/>
+    <p:sldId id="267" r:id="rId23"/>
+    <p:sldId id="269" r:id="rId24"/>
+    <p:sldId id="277" r:id="rId25"/>
+    <p:sldId id="281" r:id="rId26"/>
   </p:sldIdLst>
   <p:sldSz cx="12192000" cy="6858000"/>
   <p:notesSz cx="6858000" cy="9144000"/>
@@ -3059,6 +3060,168 @@
           <a:p>
             <a:r>
               <a:rPr lang="en-US" dirty="0"/>
+              <a:t>column</a:t>
+            </a:r>
+          </a:p>
+        </p:txBody>
+      </p:sp>
+      <p:sp>
+        <p:nvSpPr>
+          <p:cNvPr id="3" name="Content Placeholder 2"/>
+          <p:cNvSpPr>
+            <a:spLocks noGrp="1"/>
+          </p:cNvSpPr>
+          <p:nvPr>
+            <p:ph idx="1"/>
+          </p:nvPr>
+        </p:nvSpPr>
+        <p:spPr>
+          <a:xfrm>
+            <a:off x="838200" y="1825625"/>
+            <a:ext cx="10515600" cy="1606507"/>
+          </a:xfrm>
+        </p:spPr>
+        <p:txBody>
+          <a:bodyPr>
+            <a:normAutofit fontScale="92500"/>
+          </a:bodyPr>
+          <a:lstStyle/>
+          <a:p>
+            <a:r>
+              <a:rPr lang="en-US" dirty="0"/>
+              <a:t>Can format column data tidily using </a:t>
+            </a:r>
+            <a:r>
+              <a:rPr lang="en-US" dirty="0">
+                <a:latin typeface="Courier New" panose="02070309020205020404" pitchFamily="49" charset="0"/>
+                <a:cs typeface="Courier New" panose="02070309020205020404" pitchFamily="49" charset="0"/>
+              </a:rPr>
+              <a:t>column</a:t>
+            </a:r>
+            <a:endParaRPr lang="en-US" dirty="0">
+              <a:latin typeface="Courier New" panose="02070309020205020404" pitchFamily="49" charset="0"/>
+              <a:ea typeface="Courier New" charset="0"/>
+              <a:cs typeface="Courier New" panose="02070309020205020404" pitchFamily="49" charset="0"/>
+            </a:endParaRPr>
+          </a:p>
+          <a:p>
+            <a:r>
+              <a:rPr lang="en-US" dirty="0"/>
+              <a:t>e.g. </a:t>
+            </a:r>
+            <a:r>
+              <a:rPr lang="en-US" dirty="0">
+                <a:latin typeface="Courier New" charset="0"/>
+                <a:ea typeface="Courier New" charset="0"/>
+                <a:cs typeface="Courier New" charset="0"/>
+              </a:rPr>
+              <a:t>cut -f1,3-4,10 </a:t>
+            </a:r>
+            <a:r>
+              <a:rPr lang="en-US" dirty="0" err="1">
+                <a:latin typeface="Courier New" charset="0"/>
+                <a:ea typeface="Courier New" charset="0"/>
+                <a:cs typeface="Courier New" charset="0"/>
+              </a:rPr>
+              <a:t>example.tsv</a:t>
+            </a:r>
+            <a:r>
+              <a:rPr lang="en-US" dirty="0">
+                <a:latin typeface="Courier New" charset="0"/>
+                <a:ea typeface="Courier New" charset="0"/>
+                <a:cs typeface="Courier New" charset="0"/>
+              </a:rPr>
+              <a:t> | column -t | more</a:t>
+            </a:r>
+          </a:p>
+          <a:p>
+            <a:r>
+              <a:rPr lang="en-US" dirty="0">
+                <a:ea typeface="Courier New" charset="0"/>
+                <a:cs typeface="Courier New" charset="0"/>
+              </a:rPr>
+              <a:t>-t is short for “table”</a:t>
+            </a:r>
+          </a:p>
+        </p:txBody>
+      </p:sp>
+      <p:pic>
+        <p:nvPicPr>
+          <p:cNvPr id="5" name="Picture 4">
+            <a:extLst>
+              <a:ext uri="{FF2B5EF4-FFF2-40B4-BE49-F238E27FC236}">
+                <a16:creationId xmlns:a16="http://schemas.microsoft.com/office/drawing/2014/main" id="{8296AD72-30E5-0844-BA74-DFF7EE489B53}"/>
+              </a:ext>
+            </a:extLst>
+          </p:cNvPr>
+          <p:cNvPicPr>
+            <a:picLocks noChangeAspect="1"/>
+          </p:cNvPicPr>
+          <p:nvPr/>
+        </p:nvPicPr>
+        <p:blipFill>
+          <a:blip r:embed="rId2"/>
+          <a:stretch>
+            <a:fillRect/>
+          </a:stretch>
+        </p:blipFill>
+        <p:spPr>
+          <a:xfrm>
+            <a:off x="2317750" y="3567069"/>
+            <a:ext cx="7556500" cy="2794000"/>
+          </a:xfrm>
+          <a:prstGeom prst="rect">
+            <a:avLst/>
+          </a:prstGeom>
+        </p:spPr>
+      </p:pic>
+    </p:spTree>
+    <p:extLst>
+      <p:ext uri="{BB962C8B-B14F-4D97-AF65-F5344CB8AC3E}">
+        <p14:creationId xmlns:p14="http://schemas.microsoft.com/office/powerpoint/2010/main" val="2094425817"/>
+      </p:ext>
+    </p:extLst>
+  </p:cSld>
+  <p:clrMapOvr>
+    <a:masterClrMapping/>
+  </p:clrMapOvr>
+</p:sld>
+</file>
+
+<file path=ppt/slides/slide11.xml><?xml version="1.0" encoding="utf-8"?>
+<p:sld xmlns:a="http://schemas.openxmlformats.org/drawingml/2006/main" xmlns:r="http://schemas.openxmlformats.org/officeDocument/2006/relationships" xmlns:p="http://schemas.openxmlformats.org/presentationml/2006/main">
+  <p:cSld>
+    <p:spTree>
+      <p:nvGrpSpPr>
+        <p:cNvPr id="1" name=""/>
+        <p:cNvGrpSpPr/>
+        <p:nvPr/>
+      </p:nvGrpSpPr>
+      <p:grpSpPr>
+        <a:xfrm>
+          <a:off x="0" y="0"/>
+          <a:ext cx="0" cy="0"/>
+          <a:chOff x="0" y="0"/>
+          <a:chExt cx="0" cy="0"/>
+        </a:xfrm>
+      </p:grpSpPr>
+      <p:sp>
+        <p:nvSpPr>
+          <p:cNvPr id="2" name="Title 1"/>
+          <p:cNvSpPr>
+            <a:spLocks noGrp="1"/>
+          </p:cNvSpPr>
+          <p:nvPr>
+            <p:ph type="title"/>
+          </p:nvPr>
+        </p:nvSpPr>
+        <p:spPr/>
+        <p:txBody>
+          <a:bodyPr/>
+          <a:lstStyle/>
+          <a:p>
+            <a:r>
+              <a:rPr lang="en-US" dirty="0"/>
               <a:t>head</a:t>
             </a:r>
           </a:p>
@@ -3196,7 +3359,7 @@
 </p:sld>
 </file>
 
-<file path=ppt/slides/slide11.xml><?xml version="1.0" encoding="utf-8"?>
+<file path=ppt/slides/slide12.xml><?xml version="1.0" encoding="utf-8"?>
 <p:sld xmlns:a="http://schemas.openxmlformats.org/drawingml/2006/main" xmlns:r="http://schemas.openxmlformats.org/officeDocument/2006/relationships" xmlns:p="http://schemas.openxmlformats.org/presentationml/2006/main">
   <p:cSld>
     <p:spTree>
@@ -3373,7 +3536,7 @@
 </p:sld>
 </file>
 
-<file path=ppt/slides/slide12.xml><?xml version="1.0" encoding="utf-8"?>
+<file path=ppt/slides/slide13.xml><?xml version="1.0" encoding="utf-8"?>
 <p:sld xmlns:a="http://schemas.openxmlformats.org/drawingml/2006/main" xmlns:r="http://schemas.openxmlformats.org/officeDocument/2006/relationships" xmlns:p="http://schemas.openxmlformats.org/presentationml/2006/main">
   <p:cSld>
     <p:spTree>
@@ -3626,7 +3789,7 @@
 </p:sld>
 </file>
 
-<file path=ppt/slides/slide13.xml><?xml version="1.0" encoding="utf-8"?>
+<file path=ppt/slides/slide14.xml><?xml version="1.0" encoding="utf-8"?>
 <p:sld xmlns:a="http://schemas.openxmlformats.org/drawingml/2006/main" xmlns:r="http://schemas.openxmlformats.org/officeDocument/2006/relationships" xmlns:p="http://schemas.openxmlformats.org/presentationml/2006/main">
   <p:cSld>
     <p:spTree>
@@ -3843,7 +4006,7 @@
 </p:sld>
 </file>
 
-<file path=ppt/slides/slide14.xml><?xml version="1.0" encoding="utf-8"?>
+<file path=ppt/slides/slide15.xml><?xml version="1.0" encoding="utf-8"?>
 <p:sld xmlns:a="http://schemas.openxmlformats.org/drawingml/2006/main" xmlns:r="http://schemas.openxmlformats.org/officeDocument/2006/relationships" xmlns:p="http://schemas.openxmlformats.org/presentationml/2006/main">
   <p:cSld>
     <p:spTree>
@@ -3980,7 +4143,7 @@
 </p:sld>
 </file>
 
-<file path=ppt/slides/slide15.xml><?xml version="1.0" encoding="utf-8"?>
+<file path=ppt/slides/slide16.xml><?xml version="1.0" encoding="utf-8"?>
 <p:sld xmlns:a="http://schemas.openxmlformats.org/drawingml/2006/main" xmlns:r="http://schemas.openxmlformats.org/officeDocument/2006/relationships" xmlns:p="http://schemas.openxmlformats.org/presentationml/2006/main">
   <p:cSld>
     <p:spTree>
@@ -4036,7 +4199,9 @@
           </a:xfrm>
         </p:spPr>
         <p:txBody>
-          <a:bodyPr/>
+          <a:bodyPr>
+            <a:normAutofit lnSpcReduction="10000"/>
+          </a:bodyPr>
           <a:lstStyle/>
           <a:p>
             <a:r>
@@ -4106,7 +4271,7 @@
                 <a:ea typeface="Courier New" charset="0"/>
                 <a:cs typeface="Courier New" charset="0"/>
               </a:rPr>
-              <a:t> - can’t reorder columns with cut</a:t>
+              <a:t>, as requested - can’t reorder columns with cut</a:t>
             </a:r>
           </a:p>
         </p:txBody>
@@ -4154,7 +4319,7 @@
 </p:sld>
 </file>
 
-<file path=ppt/slides/slide16.xml><?xml version="1.0" encoding="utf-8"?>
+<file path=ppt/slides/slide17.xml><?xml version="1.0" encoding="utf-8"?>
 <p:sld xmlns:a="http://schemas.openxmlformats.org/drawingml/2006/main" xmlns:r="http://schemas.openxmlformats.org/officeDocument/2006/relationships" xmlns:p="http://schemas.openxmlformats.org/presentationml/2006/main">
   <p:cSld>
     <p:spTree>
@@ -4313,7 +4478,7 @@
 </p:sld>
 </file>
 
-<file path=ppt/slides/slide17.xml><?xml version="1.0" encoding="utf-8"?>
+<file path=ppt/slides/slide18.xml><?xml version="1.0" encoding="utf-8"?>
 <p:sld xmlns:a="http://schemas.openxmlformats.org/drawingml/2006/main" xmlns:r="http://schemas.openxmlformats.org/officeDocument/2006/relationships" xmlns:p="http://schemas.openxmlformats.org/presentationml/2006/main">
   <p:cSld>
     <p:spTree>
@@ -4486,7 +4651,7 @@
 </p:sld>
 </file>
 
-<file path=ppt/slides/slide18.xml><?xml version="1.0" encoding="utf-8"?>
+<file path=ppt/slides/slide19.xml><?xml version="1.0" encoding="utf-8"?>
 <p:sld xmlns:a="http://schemas.openxmlformats.org/drawingml/2006/main" xmlns:r="http://schemas.openxmlformats.org/officeDocument/2006/relationships" xmlns:p="http://schemas.openxmlformats.org/presentationml/2006/main">
   <p:cSld>
     <p:spTree>
@@ -4623,172 +4788,6 @@
 </p:sld>
 </file>
 
-<file path=ppt/slides/slide19.xml><?xml version="1.0" encoding="utf-8"?>
-<p:sld xmlns:a="http://schemas.openxmlformats.org/drawingml/2006/main" xmlns:r="http://schemas.openxmlformats.org/officeDocument/2006/relationships" xmlns:p="http://schemas.openxmlformats.org/presentationml/2006/main">
-  <p:cSld>
-    <p:spTree>
-      <p:nvGrpSpPr>
-        <p:cNvPr id="1" name=""/>
-        <p:cNvGrpSpPr/>
-        <p:nvPr/>
-      </p:nvGrpSpPr>
-      <p:grpSpPr>
-        <a:xfrm>
-          <a:off x="0" y="0"/>
-          <a:ext cx="0" cy="0"/>
-          <a:chOff x="0" y="0"/>
-          <a:chExt cx="0" cy="0"/>
-        </a:xfrm>
-      </p:grpSpPr>
-      <p:sp>
-        <p:nvSpPr>
-          <p:cNvPr id="2" name="Title 1"/>
-          <p:cNvSpPr>
-            <a:spLocks noGrp="1"/>
-          </p:cNvSpPr>
-          <p:nvPr>
-            <p:ph type="title"/>
-          </p:nvPr>
-        </p:nvSpPr>
-        <p:spPr/>
-        <p:txBody>
-          <a:bodyPr/>
-          <a:lstStyle/>
-          <a:p>
-            <a:r>
-              <a:rPr lang="en-US" dirty="0"/>
-              <a:t>grep</a:t>
-            </a:r>
-          </a:p>
-        </p:txBody>
-      </p:sp>
-      <p:sp>
-        <p:nvSpPr>
-          <p:cNvPr id="3" name="Content Placeholder 2"/>
-          <p:cNvSpPr>
-            <a:spLocks noGrp="1"/>
-          </p:cNvSpPr>
-          <p:nvPr>
-            <p:ph idx="1"/>
-          </p:nvPr>
-        </p:nvSpPr>
-        <p:spPr>
-          <a:xfrm>
-            <a:off x="838200" y="1825625"/>
-            <a:ext cx="10515600" cy="1932183"/>
-          </a:xfrm>
-        </p:spPr>
-        <p:txBody>
-          <a:bodyPr/>
-          <a:lstStyle/>
-          <a:p>
-            <a:r>
-              <a:rPr lang="en-US" dirty="0"/>
-              <a:t>Extract data by search term using </a:t>
-            </a:r>
-            <a:r>
-              <a:rPr lang="en-US" dirty="0">
-                <a:latin typeface="Courier New" charset="0"/>
-                <a:ea typeface="Courier New" charset="0"/>
-                <a:cs typeface="Courier New" charset="0"/>
-              </a:rPr>
-              <a:t>grep</a:t>
-            </a:r>
-          </a:p>
-          <a:p>
-            <a:r>
-              <a:rPr lang="en-US" dirty="0">
-                <a:latin typeface="Courier New" charset="0"/>
-                <a:ea typeface="Courier New" charset="0"/>
-                <a:cs typeface="Courier New" charset="0"/>
-              </a:rPr>
-              <a:t>grep ENSDARG00000068567 </a:t>
-            </a:r>
-            <a:r>
-              <a:rPr lang="en-US" dirty="0" err="1">
-                <a:latin typeface="Courier New" charset="0"/>
-                <a:ea typeface="Courier New" charset="0"/>
-                <a:cs typeface="Courier New" charset="0"/>
-              </a:rPr>
-              <a:t>example.tsv</a:t>
-            </a:r>
-            <a:endParaRPr lang="en-US" dirty="0">
-              <a:latin typeface="Courier New" charset="0"/>
-              <a:ea typeface="Courier New" charset="0"/>
-              <a:cs typeface="Courier New" charset="0"/>
-            </a:endParaRPr>
-          </a:p>
-          <a:p>
-            <a:r>
-              <a:rPr lang="en-US" dirty="0">
-                <a:latin typeface="Courier New" charset="0"/>
-                <a:ea typeface="Courier New" charset="0"/>
-                <a:cs typeface="Courier New" charset="0"/>
-              </a:rPr>
-              <a:t>grep shh </a:t>
-            </a:r>
-            <a:r>
-              <a:rPr lang="en-US" dirty="0" err="1">
-                <a:latin typeface="Courier New" charset="0"/>
-                <a:ea typeface="Courier New" charset="0"/>
-                <a:cs typeface="Courier New" charset="0"/>
-              </a:rPr>
-              <a:t>example.tsv</a:t>
-            </a:r>
-            <a:endParaRPr lang="en-US" dirty="0">
-              <a:latin typeface="Courier New" charset="0"/>
-              <a:ea typeface="Courier New" charset="0"/>
-              <a:cs typeface="Courier New" charset="0"/>
-            </a:endParaRPr>
-          </a:p>
-          <a:p>
-            <a:endParaRPr lang="en-US" dirty="0"/>
-          </a:p>
-        </p:txBody>
-      </p:sp>
-      <p:pic>
-        <p:nvPicPr>
-          <p:cNvPr id="6" name="Picture 5">
-            <a:extLst>
-              <a:ext uri="{FF2B5EF4-FFF2-40B4-BE49-F238E27FC236}">
-                <a16:creationId xmlns:a16="http://schemas.microsoft.com/office/drawing/2014/main" id="{3DABA4C9-6E7F-404C-BFC0-19B0E284B2E4}"/>
-              </a:ext>
-            </a:extLst>
-          </p:cNvPr>
-          <p:cNvPicPr>
-            <a:picLocks noChangeAspect="1"/>
-          </p:cNvPicPr>
-          <p:nvPr/>
-        </p:nvPicPr>
-        <p:blipFill>
-          <a:blip r:embed="rId2"/>
-          <a:stretch>
-            <a:fillRect/>
-          </a:stretch>
-        </p:blipFill>
-        <p:spPr>
-          <a:xfrm>
-            <a:off x="480811" y="4240685"/>
-            <a:ext cx="11230377" cy="829831"/>
-          </a:xfrm>
-          <a:prstGeom prst="rect">
-            <a:avLst/>
-          </a:prstGeom>
-        </p:spPr>
-      </p:pic>
-    </p:spTree>
-    <p:extLst>
-      <p:ext uri="{BB962C8B-B14F-4D97-AF65-F5344CB8AC3E}">
-        <p14:creationId xmlns:p14="http://schemas.microsoft.com/office/powerpoint/2010/main" val="804924014"/>
-      </p:ext>
-    </p:extLst>
-  </p:cSld>
-  <p:clrMapOvr>
-    <a:masterClrMapping/>
-  </p:clrMapOvr>
-</p:sld>
-</file>
-
 <file path=ppt/slides/slide2.xml><?xml version="1.0" encoding="utf-8"?>
 <p:sld xmlns:a="http://schemas.openxmlformats.org/drawingml/2006/main" xmlns:r="http://schemas.openxmlformats.org/officeDocument/2006/relationships" xmlns:p="http://schemas.openxmlformats.org/presentationml/2006/main">
   <p:cSld>
@@ -4850,7 +4849,7 @@
           <a:p>
             <a:r>
               <a:rPr lang="en-US" dirty="0"/>
-              <a:t>You can, but command line is quicker and more flexible (once you know how)</a:t>
+              <a:t>You can, but command line is quicker, more flexible and reproducible</a:t>
             </a:r>
           </a:p>
         </p:txBody>
@@ -4932,6 +4931,172 @@
           <a:p>
             <a:r>
               <a:rPr lang="en-US" dirty="0"/>
+              <a:t>grep</a:t>
+            </a:r>
+          </a:p>
+        </p:txBody>
+      </p:sp>
+      <p:sp>
+        <p:nvSpPr>
+          <p:cNvPr id="3" name="Content Placeholder 2"/>
+          <p:cNvSpPr>
+            <a:spLocks noGrp="1"/>
+          </p:cNvSpPr>
+          <p:nvPr>
+            <p:ph idx="1"/>
+          </p:nvPr>
+        </p:nvSpPr>
+        <p:spPr>
+          <a:xfrm>
+            <a:off x="838200" y="1825625"/>
+            <a:ext cx="10515600" cy="1932183"/>
+          </a:xfrm>
+        </p:spPr>
+        <p:txBody>
+          <a:bodyPr/>
+          <a:lstStyle/>
+          <a:p>
+            <a:r>
+              <a:rPr lang="en-US" dirty="0"/>
+              <a:t>Extract data by search term using </a:t>
+            </a:r>
+            <a:r>
+              <a:rPr lang="en-US" dirty="0">
+                <a:latin typeface="Courier New" charset="0"/>
+                <a:ea typeface="Courier New" charset="0"/>
+                <a:cs typeface="Courier New" charset="0"/>
+              </a:rPr>
+              <a:t>grep</a:t>
+            </a:r>
+          </a:p>
+          <a:p>
+            <a:r>
+              <a:rPr lang="en-US" dirty="0">
+                <a:latin typeface="Courier New" charset="0"/>
+                <a:ea typeface="Courier New" charset="0"/>
+                <a:cs typeface="Courier New" charset="0"/>
+              </a:rPr>
+              <a:t>grep ENSDARG00000068567 </a:t>
+            </a:r>
+            <a:r>
+              <a:rPr lang="en-US" dirty="0" err="1">
+                <a:latin typeface="Courier New" charset="0"/>
+                <a:ea typeface="Courier New" charset="0"/>
+                <a:cs typeface="Courier New" charset="0"/>
+              </a:rPr>
+              <a:t>example.tsv</a:t>
+            </a:r>
+            <a:endParaRPr lang="en-US" dirty="0">
+              <a:latin typeface="Courier New" charset="0"/>
+              <a:ea typeface="Courier New" charset="0"/>
+              <a:cs typeface="Courier New" charset="0"/>
+            </a:endParaRPr>
+          </a:p>
+          <a:p>
+            <a:r>
+              <a:rPr lang="en-US" dirty="0">
+                <a:latin typeface="Courier New" charset="0"/>
+                <a:ea typeface="Courier New" charset="0"/>
+                <a:cs typeface="Courier New" charset="0"/>
+              </a:rPr>
+              <a:t>grep shh </a:t>
+            </a:r>
+            <a:r>
+              <a:rPr lang="en-US" dirty="0" err="1">
+                <a:latin typeface="Courier New" charset="0"/>
+                <a:ea typeface="Courier New" charset="0"/>
+                <a:cs typeface="Courier New" charset="0"/>
+              </a:rPr>
+              <a:t>example.tsv</a:t>
+            </a:r>
+            <a:endParaRPr lang="en-US" dirty="0">
+              <a:latin typeface="Courier New" charset="0"/>
+              <a:ea typeface="Courier New" charset="0"/>
+              <a:cs typeface="Courier New" charset="0"/>
+            </a:endParaRPr>
+          </a:p>
+          <a:p>
+            <a:endParaRPr lang="en-US" dirty="0"/>
+          </a:p>
+        </p:txBody>
+      </p:sp>
+      <p:pic>
+        <p:nvPicPr>
+          <p:cNvPr id="6" name="Picture 5">
+            <a:extLst>
+              <a:ext uri="{FF2B5EF4-FFF2-40B4-BE49-F238E27FC236}">
+                <a16:creationId xmlns:a16="http://schemas.microsoft.com/office/drawing/2014/main" id="{3DABA4C9-6E7F-404C-BFC0-19B0E284B2E4}"/>
+              </a:ext>
+            </a:extLst>
+          </p:cNvPr>
+          <p:cNvPicPr>
+            <a:picLocks noChangeAspect="1"/>
+          </p:cNvPicPr>
+          <p:nvPr/>
+        </p:nvPicPr>
+        <p:blipFill>
+          <a:blip r:embed="rId2"/>
+          <a:stretch>
+            <a:fillRect/>
+          </a:stretch>
+        </p:blipFill>
+        <p:spPr>
+          <a:xfrm>
+            <a:off x="480811" y="4240685"/>
+            <a:ext cx="11230377" cy="829831"/>
+          </a:xfrm>
+          <a:prstGeom prst="rect">
+            <a:avLst/>
+          </a:prstGeom>
+        </p:spPr>
+      </p:pic>
+    </p:spTree>
+    <p:extLst>
+      <p:ext uri="{BB962C8B-B14F-4D97-AF65-F5344CB8AC3E}">
+        <p14:creationId xmlns:p14="http://schemas.microsoft.com/office/powerpoint/2010/main" val="804924014"/>
+      </p:ext>
+    </p:extLst>
+  </p:cSld>
+  <p:clrMapOvr>
+    <a:masterClrMapping/>
+  </p:clrMapOvr>
+</p:sld>
+</file>
+
+<file path=ppt/slides/slide21.xml><?xml version="1.0" encoding="utf-8"?>
+<p:sld xmlns:a="http://schemas.openxmlformats.org/drawingml/2006/main" xmlns:r="http://schemas.openxmlformats.org/officeDocument/2006/relationships" xmlns:p="http://schemas.openxmlformats.org/presentationml/2006/main">
+  <p:cSld>
+    <p:spTree>
+      <p:nvGrpSpPr>
+        <p:cNvPr id="1" name=""/>
+        <p:cNvGrpSpPr/>
+        <p:nvPr/>
+      </p:nvGrpSpPr>
+      <p:grpSpPr>
+        <a:xfrm>
+          <a:off x="0" y="0"/>
+          <a:ext cx="0" cy="0"/>
+          <a:chOff x="0" y="0"/>
+          <a:chExt cx="0" cy="0"/>
+        </a:xfrm>
+      </p:grpSpPr>
+      <p:sp>
+        <p:nvSpPr>
+          <p:cNvPr id="2" name="Title 1"/>
+          <p:cNvSpPr>
+            <a:spLocks noGrp="1"/>
+          </p:cNvSpPr>
+          <p:nvPr>
+            <p:ph type="title"/>
+          </p:nvPr>
+        </p:nvSpPr>
+        <p:spPr/>
+        <p:txBody>
+          <a:bodyPr/>
+          <a:lstStyle/>
+          <a:p>
+            <a:r>
+              <a:rPr lang="en-US" dirty="0"/>
               <a:t>More grep</a:t>
             </a:r>
           </a:p>
@@ -5060,7 +5225,7 @@
 </p:sld>
 </file>
 
-<file path=ppt/slides/slide21.xml><?xml version="1.0" encoding="utf-8"?>
+<file path=ppt/slides/slide22.xml><?xml version="1.0" encoding="utf-8"?>
 <p:sld xmlns:a="http://schemas.openxmlformats.org/drawingml/2006/main" xmlns:r="http://schemas.openxmlformats.org/officeDocument/2006/relationships" xmlns:p="http://schemas.openxmlformats.org/presentationml/2006/main">
   <p:cSld>
     <p:spTree>
@@ -5280,7 +5445,7 @@
 </p:sld>
 </file>
 
-<file path=ppt/slides/slide22.xml><?xml version="1.0" encoding="utf-8"?>
+<file path=ppt/slides/slide23.xml><?xml version="1.0" encoding="utf-8"?>
 <p:sld xmlns:a="http://schemas.openxmlformats.org/drawingml/2006/main" xmlns:r="http://schemas.openxmlformats.org/officeDocument/2006/relationships" xmlns:p="http://schemas.openxmlformats.org/presentationml/2006/main">
   <p:cSld>
     <p:spTree>
@@ -5336,7 +5501,9 @@
           </a:xfrm>
         </p:spPr>
         <p:txBody>
-          <a:bodyPr/>
+          <a:bodyPr>
+            <a:normAutofit fontScale="92500"/>
+          </a:bodyPr>
           <a:lstStyle/>
           <a:p>
             <a:r>
@@ -5422,7 +5589,7 @@
                 <a:ea typeface="Courier New" charset="0"/>
                 <a:cs typeface="Courier New" charset="0"/>
               </a:rPr>
-              <a:t>Take care - file will be overwritten without any warning</a:t>
+              <a:t>Take care - file will be overwritten without any warning if it already exists</a:t>
             </a:r>
           </a:p>
         </p:txBody>
@@ -5470,7 +5637,7 @@
 </p:sld>
 </file>
 
-<file path=ppt/slides/slide23.xml><?xml version="1.0" encoding="utf-8"?>
+<file path=ppt/slides/slide24.xml><?xml version="1.0" encoding="utf-8"?>
 <p:sld xmlns:a="http://schemas.openxmlformats.org/drawingml/2006/main" xmlns:r="http://schemas.openxmlformats.org/officeDocument/2006/relationships" xmlns:p="http://schemas.openxmlformats.org/presentationml/2006/main">
   <p:cSld>
     <p:spTree>
@@ -5692,7 +5859,7 @@
 </p:sld>
 </file>
 
-<file path=ppt/slides/slide24.xml><?xml version="1.0" encoding="utf-8"?>
+<file path=ppt/slides/slide25.xml><?xml version="1.0" encoding="utf-8"?>
 <p:sld xmlns:a="http://schemas.openxmlformats.org/drawingml/2006/main" xmlns:r="http://schemas.openxmlformats.org/officeDocument/2006/relationships" xmlns:p="http://schemas.openxmlformats.org/presentationml/2006/main">
   <p:cSld>
     <p:spTree>
@@ -5767,6 +5934,170 @@
 </file>
 
 <file path=ppt/slides/slide3.xml><?xml version="1.0" encoding="utf-8"?>
+<p:sld xmlns:a="http://schemas.openxmlformats.org/drawingml/2006/main" xmlns:r="http://schemas.openxmlformats.org/officeDocument/2006/relationships" xmlns:p="http://schemas.openxmlformats.org/presentationml/2006/main">
+  <p:cSld>
+    <p:spTree>
+      <p:nvGrpSpPr>
+        <p:cNvPr id="1" name=""/>
+        <p:cNvGrpSpPr/>
+        <p:nvPr/>
+      </p:nvGrpSpPr>
+      <p:grpSpPr>
+        <a:xfrm>
+          <a:off x="0" y="0"/>
+          <a:ext cx="0" cy="0"/>
+          <a:chOff x="0" y="0"/>
+          <a:chExt cx="0" cy="0"/>
+        </a:xfrm>
+      </p:grpSpPr>
+      <p:sp>
+        <p:nvSpPr>
+          <p:cNvPr id="2" name="Title 1"/>
+          <p:cNvSpPr>
+            <a:spLocks noGrp="1"/>
+          </p:cNvSpPr>
+          <p:nvPr>
+            <p:ph type="title"/>
+          </p:nvPr>
+        </p:nvSpPr>
+        <p:spPr/>
+        <p:txBody>
+          <a:bodyPr/>
+          <a:lstStyle/>
+          <a:p>
+            <a:r>
+              <a:rPr lang="en-US" dirty="0"/>
+              <a:t>Why not just use R?</a:t>
+            </a:r>
+          </a:p>
+        </p:txBody>
+      </p:sp>
+      <p:sp>
+        <p:nvSpPr>
+          <p:cNvPr id="3" name="Content Placeholder 2"/>
+          <p:cNvSpPr>
+            <a:spLocks noGrp="1"/>
+          </p:cNvSpPr>
+          <p:nvPr>
+            <p:ph idx="1"/>
+          </p:nvPr>
+        </p:nvSpPr>
+        <p:spPr>
+          <a:xfrm>
+            <a:off x="838200" y="1825624"/>
+            <a:ext cx="10515600" cy="2153947"/>
+          </a:xfrm>
+        </p:spPr>
+        <p:txBody>
+          <a:bodyPr>
+            <a:normAutofit lnSpcReduction="10000"/>
+          </a:bodyPr>
+          <a:lstStyle/>
+          <a:p>
+            <a:r>
+              <a:rPr lang="en-US" dirty="0"/>
+              <a:t>You can, and probably should, if you’re going to do analysis in R</a:t>
+            </a:r>
+          </a:p>
+          <a:p>
+            <a:r>
+              <a:rPr lang="en-US" dirty="0"/>
+              <a:t>But command line can be quicker if you’re filtering or reformatting data to use in another tool</a:t>
+            </a:r>
+          </a:p>
+          <a:p>
+            <a:r>
+              <a:rPr lang="en-US" dirty="0"/>
+              <a:t>R loads all data into memory first, so can be easier to filter and trim big data on command line before loading into R</a:t>
+            </a:r>
+          </a:p>
+        </p:txBody>
+      </p:sp>
+      <p:pic>
+        <p:nvPicPr>
+          <p:cNvPr id="5" name="Graphic 4">
+            <a:extLst>
+              <a:ext uri="{FF2B5EF4-FFF2-40B4-BE49-F238E27FC236}">
+                <a16:creationId xmlns:a16="http://schemas.microsoft.com/office/drawing/2014/main" id="{2CCDBA9D-A666-3049-B13D-CD356B96D10C}"/>
+              </a:ext>
+            </a:extLst>
+          </p:cNvPr>
+          <p:cNvPicPr>
+            <a:picLocks noChangeAspect="1"/>
+          </p:cNvPicPr>
+          <p:nvPr/>
+        </p:nvPicPr>
+        <p:blipFill>
+          <a:blip r:embed="rId2">
+            <a:extLst>
+              <a:ext uri="{96DAC541-7B7A-43D3-8B79-37D633B846F1}">
+                <asvg:svgBlip xmlns:asvg="http://schemas.microsoft.com/office/drawing/2016/SVG/main" r:embed="rId3"/>
+              </a:ext>
+            </a:extLst>
+          </a:blip>
+          <a:stretch>
+            <a:fillRect/>
+          </a:stretch>
+        </p:blipFill>
+        <p:spPr>
+          <a:xfrm>
+            <a:off x="7851015" y="3979571"/>
+            <a:ext cx="2477842" cy="1916563"/>
+          </a:xfrm>
+          <a:prstGeom prst="rect">
+            <a:avLst/>
+          </a:prstGeom>
+        </p:spPr>
+      </p:pic>
+      <p:sp>
+        <p:nvSpPr>
+          <p:cNvPr id="6" name="TextBox 5">
+            <a:extLst>
+              <a:ext uri="{FF2B5EF4-FFF2-40B4-BE49-F238E27FC236}">
+                <a16:creationId xmlns:a16="http://schemas.microsoft.com/office/drawing/2014/main" id="{DE822435-D8AC-934E-9AE4-00F3B8D06F92}"/>
+              </a:ext>
+            </a:extLst>
+          </p:cNvPr>
+          <p:cNvSpPr txBox="1"/>
+          <p:nvPr/>
+        </p:nvSpPr>
+        <p:spPr>
+          <a:xfrm>
+            <a:off x="7624292" y="5896134"/>
+            <a:ext cx="3932349" cy="276999"/>
+          </a:xfrm>
+          <a:prstGeom prst="rect">
+            <a:avLst/>
+          </a:prstGeom>
+          <a:noFill/>
+        </p:spPr>
+        <p:txBody>
+          <a:bodyPr wrap="square" rtlCol="0">
+            <a:spAutoFit/>
+          </a:bodyPr>
+          <a:lstStyle/>
+          <a:p>
+            <a:r>
+              <a:rPr lang="en-US" sz="1200" dirty="0"/>
+              <a:t>Hadley Wickham and others at RStudio [CC BY-SA 4.0]</a:t>
+            </a:r>
+          </a:p>
+        </p:txBody>
+      </p:sp>
+    </p:spTree>
+    <p:extLst>
+      <p:ext uri="{BB962C8B-B14F-4D97-AF65-F5344CB8AC3E}">
+        <p14:creationId xmlns:p14="http://schemas.microsoft.com/office/powerpoint/2010/main" val="3585455892"/>
+      </p:ext>
+    </p:extLst>
+  </p:cSld>
+  <p:clrMapOvr>
+    <a:masterClrMapping/>
+  </p:clrMapOvr>
+</p:sld>
+</file>
+
+<file path=ppt/slides/slide4.xml><?xml version="1.0" encoding="utf-8"?>
 <p:sld xmlns:a="http://schemas.openxmlformats.org/drawingml/2006/main" xmlns:r="http://schemas.openxmlformats.org/officeDocument/2006/relationships" xmlns:p="http://schemas.openxmlformats.org/presentationml/2006/main">
   <p:cSld>
     <p:spTree>
@@ -5919,165 +6250,6 @@
 </p:sld>
 </file>
 
-<file path=ppt/slides/slide4.xml><?xml version="1.0" encoding="utf-8"?>
-<p:sld xmlns:a="http://schemas.openxmlformats.org/drawingml/2006/main" xmlns:r="http://schemas.openxmlformats.org/officeDocument/2006/relationships" xmlns:p="http://schemas.openxmlformats.org/presentationml/2006/main">
-  <p:cSld>
-    <p:spTree>
-      <p:nvGrpSpPr>
-        <p:cNvPr id="1" name=""/>
-        <p:cNvGrpSpPr/>
-        <p:nvPr/>
-      </p:nvGrpSpPr>
-      <p:grpSpPr>
-        <a:xfrm>
-          <a:off x="0" y="0"/>
-          <a:ext cx="0" cy="0"/>
-          <a:chOff x="0" y="0"/>
-          <a:chExt cx="0" cy="0"/>
-        </a:xfrm>
-      </p:grpSpPr>
-      <p:sp>
-        <p:nvSpPr>
-          <p:cNvPr id="2" name="Title 1">
-            <a:extLst>
-              <a:ext uri="{FF2B5EF4-FFF2-40B4-BE49-F238E27FC236}">
-                <a16:creationId xmlns:a16="http://schemas.microsoft.com/office/drawing/2014/main" id="{A0A39E0D-534C-2B45-8798-D9E19080FD08}"/>
-              </a:ext>
-            </a:extLst>
-          </p:cNvPr>
-          <p:cNvSpPr>
-            <a:spLocks noGrp="1"/>
-          </p:cNvSpPr>
-          <p:nvPr>
-            <p:ph type="title"/>
-          </p:nvPr>
-        </p:nvSpPr>
-        <p:spPr/>
-        <p:txBody>
-          <a:bodyPr/>
-          <a:lstStyle/>
-          <a:p>
-            <a:r>
-              <a:rPr lang="en-US" dirty="0"/>
-              <a:t>Example data</a:t>
-            </a:r>
-          </a:p>
-        </p:txBody>
-      </p:sp>
-      <p:sp>
-        <p:nvSpPr>
-          <p:cNvPr id="3" name="Content Placeholder 2">
-            <a:extLst>
-              <a:ext uri="{FF2B5EF4-FFF2-40B4-BE49-F238E27FC236}">
-                <a16:creationId xmlns:a16="http://schemas.microsoft.com/office/drawing/2014/main" id="{0F3E7F1F-9044-DC41-A777-289264C0F10B}"/>
-              </a:ext>
-            </a:extLst>
-          </p:cNvPr>
-          <p:cNvSpPr>
-            <a:spLocks noGrp="1"/>
-          </p:cNvSpPr>
-          <p:nvPr>
-            <p:ph idx="1"/>
-          </p:nvPr>
-        </p:nvSpPr>
-        <p:spPr/>
-        <p:txBody>
-          <a:bodyPr/>
-          <a:lstStyle/>
-          <a:p>
-            <a:r>
-              <a:rPr lang="en-US" dirty="0"/>
-              <a:t>The example data used here can be downloaded from:</a:t>
-            </a:r>
-          </a:p>
-          <a:p>
-            <a:pPr lvl="1"/>
-            <a:r>
-              <a:rPr lang="en-US" dirty="0">
-                <a:hlinkClick r:id="rId2"/>
-              </a:rPr>
-              <a:t>https://funcgen2019.buschlab.org/downloads/command-line/example.tsv</a:t>
-            </a:r>
-            <a:endParaRPr lang="en-US" dirty="0"/>
-          </a:p>
-          <a:p>
-            <a:pPr lvl="1"/>
-            <a:r>
-              <a:rPr lang="en-US" dirty="0">
-                <a:hlinkClick r:id="rId3"/>
-              </a:rPr>
-              <a:t>https://funcgen2019.buschlab.org/downloads/command-line/myc-targets.tsv</a:t>
-            </a:r>
-            <a:endParaRPr lang="en-US" dirty="0"/>
-          </a:p>
-          <a:p>
-            <a:r>
-              <a:rPr lang="en-US" dirty="0"/>
-              <a:t>Both files are also available on </a:t>
-            </a:r>
-            <a:r>
-              <a:rPr lang="en-US" dirty="0" err="1"/>
-              <a:t>penelopeprime</a:t>
-            </a:r>
-            <a:r>
-              <a:rPr lang="en-US"/>
-              <a:t>.</a:t>
-            </a:r>
-            <a:endParaRPr lang="en-US" dirty="0"/>
-          </a:p>
-          <a:p>
-            <a:r>
-              <a:rPr lang="en-US" dirty="0"/>
-              <a:t>Mutants homozygous for two neural crest transcription factors are compared to wild-type siblings</a:t>
-            </a:r>
-            <a:br>
-              <a:rPr lang="en-US" dirty="0"/>
-            </a:br>
-            <a:r>
-              <a:rPr lang="en-US" sz="1800" dirty="0"/>
-              <a:t>(“The gene regulatory basis of genetic compensation during neural crest induction”)</a:t>
-            </a:r>
-          </a:p>
-          <a:p>
-            <a:r>
-              <a:rPr lang="en-US" dirty="0"/>
-              <a:t>Columns are: </a:t>
-            </a:r>
-            <a:r>
-              <a:rPr lang="en-US" dirty="0" err="1"/>
-              <a:t>Ensembl</a:t>
-            </a:r>
-            <a:r>
-              <a:rPr lang="en-US" dirty="0"/>
-              <a:t> gene ID (ENSDARG), p-value, adjusted p-value, log</a:t>
-            </a:r>
-            <a:r>
-              <a:rPr lang="en-US" baseline="-25000" dirty="0"/>
-              <a:t>2</a:t>
-            </a:r>
-            <a:r>
-              <a:rPr lang="en-US" dirty="0"/>
-              <a:t> fold change, chromosome, gene start (in bp), gene end (in bp), strand (1 or -1), biotype (e.g. protein coding), name and description</a:t>
-            </a:r>
-          </a:p>
-          <a:p>
-            <a:endParaRPr lang="en-US" sz="1800" dirty="0"/>
-          </a:p>
-        </p:txBody>
-      </p:sp>
-    </p:spTree>
-    <p:extLst>
-      <p:ext uri="{BB962C8B-B14F-4D97-AF65-F5344CB8AC3E}">
-        <p14:creationId xmlns:p14="http://schemas.microsoft.com/office/powerpoint/2010/main" val="3213002629"/>
-      </p:ext>
-    </p:extLst>
-  </p:cSld>
-  <p:clrMapOvr>
-    <a:masterClrMapping/>
-  </p:clrMapOvr>
-</p:sld>
-</file>
-
 <file path=ppt/slides/slide5.xml><?xml version="1.0" encoding="utf-8"?>
 <p:sld xmlns:a="http://schemas.openxmlformats.org/drawingml/2006/main" xmlns:r="http://schemas.openxmlformats.org/officeDocument/2006/relationships" xmlns:p="http://schemas.openxmlformats.org/presentationml/2006/main">
   <p:cSld>
@@ -6100,6 +6272,165 @@
           <p:cNvPr id="2" name="Title 1">
             <a:extLst>
               <a:ext uri="{FF2B5EF4-FFF2-40B4-BE49-F238E27FC236}">
+                <a16:creationId xmlns:a16="http://schemas.microsoft.com/office/drawing/2014/main" id="{A0A39E0D-534C-2B45-8798-D9E19080FD08}"/>
+              </a:ext>
+            </a:extLst>
+          </p:cNvPr>
+          <p:cNvSpPr>
+            <a:spLocks noGrp="1"/>
+          </p:cNvSpPr>
+          <p:nvPr>
+            <p:ph type="title"/>
+          </p:nvPr>
+        </p:nvSpPr>
+        <p:spPr/>
+        <p:txBody>
+          <a:bodyPr/>
+          <a:lstStyle/>
+          <a:p>
+            <a:r>
+              <a:rPr lang="en-US" dirty="0"/>
+              <a:t>Example data</a:t>
+            </a:r>
+          </a:p>
+        </p:txBody>
+      </p:sp>
+      <p:sp>
+        <p:nvSpPr>
+          <p:cNvPr id="3" name="Content Placeholder 2">
+            <a:extLst>
+              <a:ext uri="{FF2B5EF4-FFF2-40B4-BE49-F238E27FC236}">
+                <a16:creationId xmlns:a16="http://schemas.microsoft.com/office/drawing/2014/main" id="{0F3E7F1F-9044-DC41-A777-289264C0F10B}"/>
+              </a:ext>
+            </a:extLst>
+          </p:cNvPr>
+          <p:cNvSpPr>
+            <a:spLocks noGrp="1"/>
+          </p:cNvSpPr>
+          <p:nvPr>
+            <p:ph idx="1"/>
+          </p:nvPr>
+        </p:nvSpPr>
+        <p:spPr/>
+        <p:txBody>
+          <a:bodyPr/>
+          <a:lstStyle/>
+          <a:p>
+            <a:r>
+              <a:rPr lang="en-US" dirty="0"/>
+              <a:t>The example data used here can be downloaded from:</a:t>
+            </a:r>
+          </a:p>
+          <a:p>
+            <a:pPr lvl="1"/>
+            <a:r>
+              <a:rPr lang="en-US" dirty="0">
+                <a:hlinkClick r:id="rId2"/>
+              </a:rPr>
+              <a:t>https://funcgen2019.buschlab.org/downloads/command-line/example.tsv</a:t>
+            </a:r>
+            <a:endParaRPr lang="en-US" dirty="0"/>
+          </a:p>
+          <a:p>
+            <a:pPr lvl="1"/>
+            <a:r>
+              <a:rPr lang="en-US" dirty="0">
+                <a:hlinkClick r:id="rId3"/>
+              </a:rPr>
+              <a:t>https://funcgen2019.buschlab.org/downloads/command-line/myc-targets.tsv</a:t>
+            </a:r>
+            <a:endParaRPr lang="en-US" dirty="0"/>
+          </a:p>
+          <a:p>
+            <a:r>
+              <a:rPr lang="en-US" dirty="0"/>
+              <a:t>Both files are also available on </a:t>
+            </a:r>
+            <a:r>
+              <a:rPr lang="en-US" dirty="0" err="1"/>
+              <a:t>penelopeprime</a:t>
+            </a:r>
+            <a:r>
+              <a:rPr lang="en-US"/>
+              <a:t>.</a:t>
+            </a:r>
+            <a:endParaRPr lang="en-US" dirty="0"/>
+          </a:p>
+          <a:p>
+            <a:r>
+              <a:rPr lang="en-US" dirty="0"/>
+              <a:t>Mutants homozygous for two neural crest transcription factors are compared to wild-type siblings</a:t>
+            </a:r>
+            <a:br>
+              <a:rPr lang="en-US" dirty="0"/>
+            </a:br>
+            <a:r>
+              <a:rPr lang="en-US" sz="1800" dirty="0"/>
+              <a:t>(“The gene regulatory basis of genetic compensation during neural crest induction”)</a:t>
+            </a:r>
+          </a:p>
+          <a:p>
+            <a:r>
+              <a:rPr lang="en-US" dirty="0"/>
+              <a:t>Columns are: </a:t>
+            </a:r>
+            <a:r>
+              <a:rPr lang="en-US" dirty="0" err="1"/>
+              <a:t>Ensembl</a:t>
+            </a:r>
+            <a:r>
+              <a:rPr lang="en-US" dirty="0"/>
+              <a:t> gene ID (ENSDARG), p-value, adjusted p-value, log</a:t>
+            </a:r>
+            <a:r>
+              <a:rPr lang="en-US" baseline="-25000" dirty="0"/>
+              <a:t>2</a:t>
+            </a:r>
+            <a:r>
+              <a:rPr lang="en-US" dirty="0"/>
+              <a:t> fold change, chromosome, gene start (in bp), gene end (in bp), strand (1 or -1), biotype (e.g. protein coding), name and description</a:t>
+            </a:r>
+          </a:p>
+          <a:p>
+            <a:endParaRPr lang="en-US" sz="1800" dirty="0"/>
+          </a:p>
+        </p:txBody>
+      </p:sp>
+    </p:spTree>
+    <p:extLst>
+      <p:ext uri="{BB962C8B-B14F-4D97-AF65-F5344CB8AC3E}">
+        <p14:creationId xmlns:p14="http://schemas.microsoft.com/office/powerpoint/2010/main" val="3213002629"/>
+      </p:ext>
+    </p:extLst>
+  </p:cSld>
+  <p:clrMapOvr>
+    <a:masterClrMapping/>
+  </p:clrMapOvr>
+</p:sld>
+</file>
+
+<file path=ppt/slides/slide6.xml><?xml version="1.0" encoding="utf-8"?>
+<p:sld xmlns:a="http://schemas.openxmlformats.org/drawingml/2006/main" xmlns:r="http://schemas.openxmlformats.org/officeDocument/2006/relationships" xmlns:p="http://schemas.openxmlformats.org/presentationml/2006/main">
+  <p:cSld>
+    <p:spTree>
+      <p:nvGrpSpPr>
+        <p:cNvPr id="1" name=""/>
+        <p:cNvGrpSpPr/>
+        <p:nvPr/>
+      </p:nvGrpSpPr>
+      <p:grpSpPr>
+        <a:xfrm>
+          <a:off x="0" y="0"/>
+          <a:ext cx="0" cy="0"/>
+          <a:chOff x="0" y="0"/>
+          <a:chExt cx="0" cy="0"/>
+        </a:xfrm>
+      </p:grpSpPr>
+      <p:sp>
+        <p:nvSpPr>
+          <p:cNvPr id="2" name="Title 1">
+            <a:extLst>
+              <a:ext uri="{FF2B5EF4-FFF2-40B4-BE49-F238E27FC236}">
                 <a16:creationId xmlns:a16="http://schemas.microsoft.com/office/drawing/2014/main" id="{549B6D24-A871-CE40-B0C8-ABE4085A077F}"/>
               </a:ext>
             </a:extLst>
@@ -6313,7 +6644,7 @@
 </p:sld>
 </file>
 
-<file path=ppt/slides/slide6.xml><?xml version="1.0" encoding="utf-8"?>
+<file path=ppt/slides/slide7.xml><?xml version="1.0" encoding="utf-8"?>
 <p:sld xmlns:a="http://schemas.openxmlformats.org/drawingml/2006/main" xmlns:r="http://schemas.openxmlformats.org/officeDocument/2006/relationships" xmlns:p="http://schemas.openxmlformats.org/presentationml/2006/main">
   <p:cSld>
     <p:spTree>
@@ -6599,7 +6930,7 @@
 </p:sld>
 </file>
 
-<file path=ppt/slides/slide7.xml><?xml version="1.0" encoding="utf-8"?>
+<file path=ppt/slides/slide8.xml><?xml version="1.0" encoding="utf-8"?>
 <p:sld xmlns:a="http://schemas.openxmlformats.org/drawingml/2006/main" xmlns:r="http://schemas.openxmlformats.org/officeDocument/2006/relationships" xmlns:p="http://schemas.openxmlformats.org/presentationml/2006/main">
   <p:cSld>
     <p:spTree>
@@ -6777,7 +7108,7 @@
 </p:sld>
 </file>
 
-<file path=ppt/slides/slide8.xml><?xml version="1.0" encoding="utf-8"?>
+<file path=ppt/slides/slide9.xml><?xml version="1.0" encoding="utf-8"?>
 <p:sld xmlns:a="http://schemas.openxmlformats.org/drawingml/2006/main" xmlns:r="http://schemas.openxmlformats.org/officeDocument/2006/relationships" xmlns:p="http://schemas.openxmlformats.org/presentationml/2006/main">
   <p:cSld>
     <p:spTree>
@@ -6959,168 +7290,6 @@
     <p:extLst>
       <p:ext uri="{BB962C8B-B14F-4D97-AF65-F5344CB8AC3E}">
         <p14:creationId xmlns:p14="http://schemas.microsoft.com/office/powerpoint/2010/main" val="1006275576"/>
-      </p:ext>
-    </p:extLst>
-  </p:cSld>
-  <p:clrMapOvr>
-    <a:masterClrMapping/>
-  </p:clrMapOvr>
-</p:sld>
-</file>
-
-<file path=ppt/slides/slide9.xml><?xml version="1.0" encoding="utf-8"?>
-<p:sld xmlns:a="http://schemas.openxmlformats.org/drawingml/2006/main" xmlns:r="http://schemas.openxmlformats.org/officeDocument/2006/relationships" xmlns:p="http://schemas.openxmlformats.org/presentationml/2006/main">
-  <p:cSld>
-    <p:spTree>
-      <p:nvGrpSpPr>
-        <p:cNvPr id="1" name=""/>
-        <p:cNvGrpSpPr/>
-        <p:nvPr/>
-      </p:nvGrpSpPr>
-      <p:grpSpPr>
-        <a:xfrm>
-          <a:off x="0" y="0"/>
-          <a:ext cx="0" cy="0"/>
-          <a:chOff x="0" y="0"/>
-          <a:chExt cx="0" cy="0"/>
-        </a:xfrm>
-      </p:grpSpPr>
-      <p:sp>
-        <p:nvSpPr>
-          <p:cNvPr id="2" name="Title 1"/>
-          <p:cNvSpPr>
-            <a:spLocks noGrp="1"/>
-          </p:cNvSpPr>
-          <p:nvPr>
-            <p:ph type="title"/>
-          </p:nvPr>
-        </p:nvSpPr>
-        <p:spPr/>
-        <p:txBody>
-          <a:bodyPr/>
-          <a:lstStyle/>
-          <a:p>
-            <a:r>
-              <a:rPr lang="en-US" dirty="0"/>
-              <a:t>column</a:t>
-            </a:r>
-          </a:p>
-        </p:txBody>
-      </p:sp>
-      <p:sp>
-        <p:nvSpPr>
-          <p:cNvPr id="3" name="Content Placeholder 2"/>
-          <p:cNvSpPr>
-            <a:spLocks noGrp="1"/>
-          </p:cNvSpPr>
-          <p:nvPr>
-            <p:ph idx="1"/>
-          </p:nvPr>
-        </p:nvSpPr>
-        <p:spPr>
-          <a:xfrm>
-            <a:off x="838200" y="1825625"/>
-            <a:ext cx="10515600" cy="1606507"/>
-          </a:xfrm>
-        </p:spPr>
-        <p:txBody>
-          <a:bodyPr>
-            <a:normAutofit fontScale="92500"/>
-          </a:bodyPr>
-          <a:lstStyle/>
-          <a:p>
-            <a:r>
-              <a:rPr lang="en-US" dirty="0"/>
-              <a:t>Can format column data tidily using </a:t>
-            </a:r>
-            <a:r>
-              <a:rPr lang="en-US" dirty="0">
-                <a:latin typeface="Courier New" panose="02070309020205020404" pitchFamily="49" charset="0"/>
-                <a:cs typeface="Courier New" panose="02070309020205020404" pitchFamily="49" charset="0"/>
-              </a:rPr>
-              <a:t>column</a:t>
-            </a:r>
-            <a:endParaRPr lang="en-US" dirty="0">
-              <a:latin typeface="Courier New" panose="02070309020205020404" pitchFamily="49" charset="0"/>
-              <a:ea typeface="Courier New" charset="0"/>
-              <a:cs typeface="Courier New" panose="02070309020205020404" pitchFamily="49" charset="0"/>
-            </a:endParaRPr>
-          </a:p>
-          <a:p>
-            <a:r>
-              <a:rPr lang="en-US" dirty="0"/>
-              <a:t>e.g. </a:t>
-            </a:r>
-            <a:r>
-              <a:rPr lang="en-US" dirty="0">
-                <a:latin typeface="Courier New" charset="0"/>
-                <a:ea typeface="Courier New" charset="0"/>
-                <a:cs typeface="Courier New" charset="0"/>
-              </a:rPr>
-              <a:t>cut -f1,3-4,10 </a:t>
-            </a:r>
-            <a:r>
-              <a:rPr lang="en-US" dirty="0" err="1">
-                <a:latin typeface="Courier New" charset="0"/>
-                <a:ea typeface="Courier New" charset="0"/>
-                <a:cs typeface="Courier New" charset="0"/>
-              </a:rPr>
-              <a:t>example.tsv</a:t>
-            </a:r>
-            <a:r>
-              <a:rPr lang="en-US" dirty="0">
-                <a:latin typeface="Courier New" charset="0"/>
-                <a:ea typeface="Courier New" charset="0"/>
-                <a:cs typeface="Courier New" charset="0"/>
-              </a:rPr>
-              <a:t> | column -t | more</a:t>
-            </a:r>
-          </a:p>
-          <a:p>
-            <a:r>
-              <a:rPr lang="en-US" dirty="0">
-                <a:ea typeface="Courier New" charset="0"/>
-                <a:cs typeface="Courier New" charset="0"/>
-              </a:rPr>
-              <a:t>-t is short for “table”</a:t>
-            </a:r>
-          </a:p>
-        </p:txBody>
-      </p:sp>
-      <p:pic>
-        <p:nvPicPr>
-          <p:cNvPr id="5" name="Picture 4">
-            <a:extLst>
-              <a:ext uri="{FF2B5EF4-FFF2-40B4-BE49-F238E27FC236}">
-                <a16:creationId xmlns:a16="http://schemas.microsoft.com/office/drawing/2014/main" id="{8296AD72-30E5-0844-BA74-DFF7EE489B53}"/>
-              </a:ext>
-            </a:extLst>
-          </p:cNvPr>
-          <p:cNvPicPr>
-            <a:picLocks noChangeAspect="1"/>
-          </p:cNvPicPr>
-          <p:nvPr/>
-        </p:nvPicPr>
-        <p:blipFill>
-          <a:blip r:embed="rId2"/>
-          <a:stretch>
-            <a:fillRect/>
-          </a:stretch>
-        </p:blipFill>
-        <p:spPr>
-          <a:xfrm>
-            <a:off x="2317750" y="3567069"/>
-            <a:ext cx="7556500" cy="2794000"/>
-          </a:xfrm>
-          <a:prstGeom prst="rect">
-            <a:avLst/>
-          </a:prstGeom>
-        </p:spPr>
-      </p:pic>
-    </p:spTree>
-    <p:extLst>
-      <p:ext uri="{BB962C8B-B14F-4D97-AF65-F5344CB8AC3E}">
-        <p14:creationId xmlns:p14="http://schemas.microsoft.com/office/powerpoint/2010/main" val="2094425817"/>
       </p:ext>
     </p:extLst>
   </p:cSld>

</xml_diff>